<commit_message>
Netzwerk-Prototyp zur Präsentation hinzugefügt
</commit_message>
<xml_diff>
--- a/ProofOfConcept.pptx
+++ b/ProofOfConcept.pptx
@@ -5,14 +5,15 @@
     <p:sldMasterId id="2147483648" r:id="rId1"/>
   </p:sldMasterIdLst>
   <p:notesMasterIdLst>
-    <p:notesMasterId r:id="rId7"/>
+    <p:notesMasterId r:id="rId8"/>
   </p:notesMasterIdLst>
   <p:sldIdLst>
     <p:sldId id="256" r:id="rId2"/>
     <p:sldId id="257" r:id="rId3"/>
     <p:sldId id="259" r:id="rId4"/>
     <p:sldId id="258" r:id="rId5"/>
-    <p:sldId id="260" r:id="rId6"/>
+    <p:sldId id="261" r:id="rId6"/>
+    <p:sldId id="260" r:id="rId7"/>
   </p:sldIdLst>
   <p:sldSz cx="12192000" cy="6858000"/>
   <p:notesSz cx="6858000" cy="9144000"/>
@@ -111,6 +112,11 @@
       </a:defRPr>
     </a:lvl9pPr>
   </p:defaultTextStyle>
+  <p:extLst>
+    <p:ext uri="{EFAFB233-063F-42B5-8137-9DF3F51BA10A}">
+      <p15:sldGuideLst xmlns:p15="http://schemas.microsoft.com/office/powerpoint/2012/main"/>
+    </p:ext>
+  </p:extLst>
 </p:presentation>
 </file>
 
@@ -163,7 +169,7 @@
             </a:lvl1pPr>
           </a:lstStyle>
           <a:p>
-            <a:endParaRPr lang="de-DE"/>
+            <a:endParaRPr lang="de-DE" dirty="0"/>
           </a:p>
         </p:txBody>
       </p:sp>
@@ -198,7 +204,7 @@
               <a:rPr lang="de-DE" smtClean="0"/>
               <a:t>28.06.2015</a:t>
             </a:fld>
-            <a:endParaRPr lang="de-DE"/>
+            <a:endParaRPr lang="de-DE" dirty="0"/>
           </a:p>
         </p:txBody>
       </p:sp>
@@ -231,7 +237,7 @@
           <a:bodyPr vert="horz" lIns="91440" tIns="45720" rIns="91440" bIns="45720" rtlCol="0" anchor="ctr"/>
           <a:lstStyle/>
           <a:p>
-            <a:endParaRPr lang="de-DE"/>
+            <a:endParaRPr lang="de-DE" dirty="0"/>
           </a:p>
         </p:txBody>
       </p:sp>
@@ -322,7 +328,7 @@
             </a:lvl1pPr>
           </a:lstStyle>
           <a:p>
-            <a:endParaRPr lang="de-DE"/>
+            <a:endParaRPr lang="de-DE" dirty="0"/>
           </a:p>
         </p:txBody>
       </p:sp>
@@ -357,7 +363,7 @@
               <a:rPr lang="de-DE" smtClean="0"/>
               <a:t>‹Nr.›</a:t>
             </a:fld>
-            <a:endParaRPr lang="de-DE"/>
+            <a:endParaRPr lang="de-DE" dirty="0"/>
           </a:p>
         </p:txBody>
       </p:sp>
@@ -2931,7 +2937,7 @@
           </a:lstStyle>
           <a:p>
             <a:r>
-              <a:rPr lang="de-DE" smtClean="0"/>
+              <a:rPr lang="de-DE" dirty="0" smtClean="0"/>
               <a:t>Bild durch Klicken auf Symbol hinzufügen</a:t>
             </a:r>
             <a:endParaRPr lang="en-US" dirty="0"/>
@@ -4424,7 +4430,11 @@
           <a:p>
             <a:r>
               <a:rPr lang="de-DE" dirty="0" smtClean="0"/>
-              <a:t>Danke für eure Aufmerksamkeit!</a:t>
+              <a:t>Prototyp: </a:t>
+            </a:r>
+            <a:r>
+              <a:rPr lang="de-DE" dirty="0" smtClean="0"/>
+              <a:t>NETZWERK</a:t>
             </a:r>
             <a:endParaRPr lang="de-DE" dirty="0"/>
           </a:p>
@@ -4445,7 +4455,103 @@
           <a:bodyPr/>
           <a:lstStyle/>
           <a:p>
-            <a:endParaRPr lang="de-DE"/>
+            <a:pPr>
+              <a:buFont typeface="Courier New" panose="02070309020205020404" pitchFamily="49" charset="0"/>
+              <a:buChar char="o"/>
+            </a:pPr>
+            <a:r>
+              <a:rPr lang="de-DE" dirty="0"/>
+              <a:t> </a:t>
+            </a:r>
+            <a:r>
+              <a:rPr lang="de-DE" dirty="0" smtClean="0"/>
+              <a:t>Server-Client-Struktur, Server überträgt die Positionen der einzelnen Spieler</a:t>
+            </a:r>
+          </a:p>
+          <a:p>
+            <a:pPr>
+              <a:buFont typeface="Courier New" panose="02070309020205020404" pitchFamily="49" charset="0"/>
+              <a:buChar char="o"/>
+            </a:pPr>
+            <a:r>
+              <a:rPr lang="de-DE" dirty="0"/>
+              <a:t> </a:t>
+            </a:r>
+            <a:r>
+              <a:rPr lang="de-DE" dirty="0" smtClean="0"/>
+              <a:t>nutzt KryoNet</a:t>
+            </a:r>
+          </a:p>
+          <a:p>
+            <a:pPr>
+              <a:buFont typeface="Courier New" panose="02070309020205020404" pitchFamily="49" charset="0"/>
+              <a:buChar char="o"/>
+            </a:pPr>
+            <a:r>
+              <a:rPr lang="de-DE" dirty="0"/>
+              <a:t> </a:t>
+            </a:r>
+            <a:r>
+              <a:rPr lang="de-DE" dirty="0" smtClean="0"/>
+              <a:t>Erweiterungen:</a:t>
+            </a:r>
+          </a:p>
+          <a:p>
+            <a:pPr lvl="1">
+              <a:buFont typeface="Courier New" panose="02070309020205020404" pitchFamily="49" charset="0"/>
+              <a:buChar char="o"/>
+            </a:pPr>
+            <a:r>
+              <a:rPr lang="de-DE" dirty="0"/>
+              <a:t> </a:t>
+            </a:r>
+            <a:r>
+              <a:rPr lang="de-DE" dirty="0" smtClean="0"/>
+              <a:t>UDP statt TCP</a:t>
+            </a:r>
+          </a:p>
+          <a:p>
+            <a:pPr lvl="1">
+              <a:buFont typeface="Courier New" panose="02070309020205020404" pitchFamily="49" charset="0"/>
+              <a:buChar char="o"/>
+            </a:pPr>
+            <a:r>
+              <a:rPr lang="de-DE" dirty="0"/>
+              <a:t> </a:t>
+            </a:r>
+            <a:r>
+              <a:rPr lang="de-DE" dirty="0" smtClean="0"/>
+              <a:t>Animationen der Spieler übertragen</a:t>
+            </a:r>
+          </a:p>
+          <a:p>
+            <a:pPr lvl="1">
+              <a:buFont typeface="Courier New" panose="02070309020205020404" pitchFamily="49" charset="0"/>
+              <a:buChar char="o"/>
+            </a:pPr>
+            <a:r>
+              <a:rPr lang="de-DE" dirty="0"/>
+              <a:t> </a:t>
+            </a:r>
+            <a:r>
+              <a:rPr lang="de-DE" dirty="0" smtClean="0"/>
+              <a:t>automatischer Server-Finder</a:t>
+            </a:r>
+          </a:p>
+          <a:p>
+            <a:pPr lvl="1">
+              <a:buFont typeface="Courier New" panose="02070309020205020404" pitchFamily="49" charset="0"/>
+              <a:buChar char="o"/>
+            </a:pPr>
+            <a:r>
+              <a:rPr lang="de-DE" dirty="0"/>
+              <a:t> </a:t>
+            </a:r>
+            <a:r>
+              <a:rPr lang="de-DE" dirty="0" smtClean="0"/>
+              <a:t>Disconnect-Handling</a:t>
+            </a:r>
+            <a:endParaRPr lang="de-DE" dirty="0"/>
           </a:p>
         </p:txBody>
       </p:sp>
@@ -4467,6 +4573,138 @@
             <a:fld id="{4FAB73BC-B049-4115-A692-8D63A059BFB8}" type="slidenum">
               <a:rPr lang="en-US" smtClean="0"/>
               <a:t>5</a:t>
+            </a:fld>
+            <a:endParaRPr lang="en-US" dirty="0"/>
+          </a:p>
+        </p:txBody>
+      </p:sp>
+      <p:pic>
+        <p:nvPicPr>
+          <p:cNvPr id="5" name="Grafik 4"/>
+          <p:cNvPicPr>
+            <a:picLocks noChangeAspect="1"/>
+          </p:cNvPicPr>
+          <p:nvPr/>
+        </p:nvPicPr>
+        <p:blipFill>
+          <a:blip r:embed="rId2">
+            <a:extLst>
+              <a:ext uri="{28A0092B-C50C-407E-A947-70E740481C1C}">
+                <a14:useLocalDpi xmlns:a14="http://schemas.microsoft.com/office/drawing/2010/main" val="0"/>
+              </a:ext>
+            </a:extLst>
+          </a:blip>
+          <a:stretch>
+            <a:fillRect/>
+          </a:stretch>
+        </p:blipFill>
+        <p:spPr>
+          <a:xfrm>
+            <a:off x="5513258" y="2953653"/>
+            <a:ext cx="4226306" cy="2688054"/>
+          </a:xfrm>
+          <a:prstGeom prst="rect">
+            <a:avLst/>
+          </a:prstGeom>
+        </p:spPr>
+      </p:pic>
+    </p:spTree>
+    <p:extLst>
+      <p:ext uri="{BB962C8B-B14F-4D97-AF65-F5344CB8AC3E}">
+        <p14:creationId xmlns:p14="http://schemas.microsoft.com/office/powerpoint/2010/main" val="992161669"/>
+      </p:ext>
+    </p:extLst>
+  </p:cSld>
+  <p:clrMapOvr>
+    <a:masterClrMapping/>
+  </p:clrMapOvr>
+  <p:timing>
+    <p:tnLst>
+      <p:par>
+        <p:cTn id="1" dur="indefinite" restart="never" nodeType="tmRoot"/>
+      </p:par>
+    </p:tnLst>
+  </p:timing>
+</p:sld>
+</file>
+
+<file path=ppt/slides/slide6.xml><?xml version="1.0" encoding="utf-8"?>
+<p:sld xmlns:a="http://schemas.openxmlformats.org/drawingml/2006/main" xmlns:r="http://schemas.openxmlformats.org/officeDocument/2006/relationships" xmlns:p="http://schemas.openxmlformats.org/presentationml/2006/main">
+  <p:cSld>
+    <p:spTree>
+      <p:nvGrpSpPr>
+        <p:cNvPr id="1" name=""/>
+        <p:cNvGrpSpPr/>
+        <p:nvPr/>
+      </p:nvGrpSpPr>
+      <p:grpSpPr>
+        <a:xfrm>
+          <a:off x="0" y="0"/>
+          <a:ext cx="0" cy="0"/>
+          <a:chOff x="0" y="0"/>
+          <a:chExt cx="0" cy="0"/>
+        </a:xfrm>
+      </p:grpSpPr>
+      <p:sp>
+        <p:nvSpPr>
+          <p:cNvPr id="2" name="Titel 1"/>
+          <p:cNvSpPr>
+            <a:spLocks noGrp="1"/>
+          </p:cNvSpPr>
+          <p:nvPr>
+            <p:ph type="title"/>
+          </p:nvPr>
+        </p:nvSpPr>
+        <p:spPr/>
+        <p:txBody>
+          <a:bodyPr/>
+          <a:lstStyle/>
+          <a:p>
+            <a:r>
+              <a:rPr lang="de-DE" dirty="0" smtClean="0"/>
+              <a:t>Danke für eure Aufmerksamkeit!</a:t>
+            </a:r>
+            <a:endParaRPr lang="de-DE" dirty="0"/>
+          </a:p>
+        </p:txBody>
+      </p:sp>
+      <p:sp>
+        <p:nvSpPr>
+          <p:cNvPr id="3" name="Inhaltsplatzhalter 2"/>
+          <p:cNvSpPr>
+            <a:spLocks noGrp="1"/>
+          </p:cNvSpPr>
+          <p:nvPr>
+            <p:ph idx="1"/>
+          </p:nvPr>
+        </p:nvSpPr>
+        <p:spPr/>
+        <p:txBody>
+          <a:bodyPr/>
+          <a:lstStyle/>
+          <a:p>
+            <a:endParaRPr lang="de-DE" dirty="0"/>
+          </a:p>
+        </p:txBody>
+      </p:sp>
+      <p:sp>
+        <p:nvSpPr>
+          <p:cNvPr id="4" name="Foliennummernplatzhalter 3"/>
+          <p:cNvSpPr>
+            <a:spLocks noGrp="1"/>
+          </p:cNvSpPr>
+          <p:nvPr>
+            <p:ph type="sldNum" sz="quarter" idx="12"/>
+          </p:nvPr>
+        </p:nvSpPr>
+        <p:spPr/>
+        <p:txBody>
+          <a:bodyPr/>
+          <a:lstStyle/>
+          <a:p>
+            <a:fld id="{4FAB73BC-B049-4115-A692-8D63A059BFB8}" type="slidenum">
+              <a:rPr lang="en-US" smtClean="0"/>
+              <a:t>6</a:t>
             </a:fld>
             <a:endParaRPr lang="en-US" dirty="0"/>
           </a:p>

</xml_diff>

<commit_message>
Netzwerk zum Inhaltsverzeichnis hinzugefügt
</commit_message>
<xml_diff>
--- a/ProofOfConcept.pptx
+++ b/ProofOfConcept.pptx
@@ -202,7 +202,7 @@
           <a:p>
             <a:fld id="{775538D2-CDA2-461B-BCB9-09CEEFC43B50}" type="datetimeFigureOut">
               <a:rPr lang="de-DE" smtClean="0"/>
-              <a:t>28.06.2015</a:t>
+              <a:t>29.06.2015</a:t>
             </a:fld>
             <a:endParaRPr lang="de-DE" dirty="0"/>
           </a:p>
@@ -744,7 +744,7 @@
           <a:p>
             <a:fld id="{6B96CB40-6DDC-43D8-86DF-AEBE74676DFA}" type="datetime1">
               <a:rPr lang="en-US" smtClean="0"/>
-              <a:t>6/28/2015</a:t>
+              <a:t>6/29/2015</a:t>
             </a:fld>
             <a:endParaRPr lang="en-US" dirty="0"/>
           </a:p>
@@ -944,7 +944,7 @@
           <a:p>
             <a:fld id="{F62B54A4-1E9F-40B8-B275-4A913B685E84}" type="datetime1">
               <a:rPr lang="en-US" smtClean="0"/>
-              <a:t>6/28/2015</a:t>
+              <a:t>6/29/2015</a:t>
             </a:fld>
             <a:endParaRPr lang="en-US" dirty="0"/>
           </a:p>
@@ -1119,7 +1119,7 @@
           <a:p>
             <a:fld id="{EF01AE7C-025A-4F1C-A48B-A7CF6A547553}" type="datetime1">
               <a:rPr lang="en-US" smtClean="0"/>
-              <a:t>6/28/2015</a:t>
+              <a:t>6/29/2015</a:t>
             </a:fld>
             <a:endParaRPr lang="en-US" dirty="0"/>
           </a:p>
@@ -1319,7 +1319,7 @@
           <a:p>
             <a:fld id="{57E9D6E6-4ADE-4765-BBCB-F90085A5C47F}" type="datetime1">
               <a:rPr lang="en-US" smtClean="0"/>
-              <a:t>6/28/2015</a:t>
+              <a:t>6/29/2015</a:t>
             </a:fld>
             <a:endParaRPr lang="en-US" dirty="0"/>
           </a:p>
@@ -1609,7 +1609,7 @@
           <a:p>
             <a:fld id="{C939F140-25D0-4D34-A464-1BB6F60B99DA}" type="datetime1">
               <a:rPr lang="en-US" smtClean="0"/>
-              <a:t>6/28/2015</a:t>
+              <a:t>6/29/2015</a:t>
             </a:fld>
             <a:endParaRPr lang="en-US" dirty="0"/>
           </a:p>
@@ -1876,7 +1876,7 @@
           <a:p>
             <a:fld id="{111153D9-135D-4191-AFE1-B0042E87A7A9}" type="datetime1">
               <a:rPr lang="en-US" smtClean="0"/>
-              <a:t>6/28/2015</a:t>
+              <a:t>6/29/2015</a:t>
             </a:fld>
             <a:endParaRPr lang="en-US" dirty="0"/>
           </a:p>
@@ -2278,7 +2278,7 @@
           <a:p>
             <a:fld id="{02D74AD4-4DC9-4C15-8C68-7E586E4120B0}" type="datetime1">
               <a:rPr lang="en-US" smtClean="0"/>
-              <a:t>6/28/2015</a:t>
+              <a:t>6/29/2015</a:t>
             </a:fld>
             <a:endParaRPr lang="en-US" dirty="0"/>
           </a:p>
@@ -2391,7 +2391,7 @@
           <a:p>
             <a:fld id="{F6C956CE-0BB8-4899-AA27-9F29A64F4002}" type="datetime1">
               <a:rPr lang="en-US" smtClean="0"/>
-              <a:t>6/28/2015</a:t>
+              <a:t>6/29/2015</a:t>
             </a:fld>
             <a:endParaRPr lang="en-US" dirty="0"/>
           </a:p>
@@ -2481,7 +2481,7 @@
           <a:p>
             <a:fld id="{E8F7CE71-D225-4E60-A63A-A5B5B733A389}" type="datetime1">
               <a:rPr lang="en-US" smtClean="0"/>
-              <a:t>6/28/2015</a:t>
+              <a:t>6/29/2015</a:t>
             </a:fld>
             <a:endParaRPr lang="en-US" dirty="0"/>
           </a:p>
@@ -2766,7 +2766,7 @@
           <a:p>
             <a:fld id="{31E604BD-168A-4F1E-806A-D481AB0B8DAB}" type="datetime1">
               <a:rPr lang="en-US" smtClean="0"/>
-              <a:t>6/28/2015</a:t>
+              <a:t>6/29/2015</a:t>
             </a:fld>
             <a:endParaRPr lang="en-US" dirty="0"/>
           </a:p>
@@ -3041,7 +3041,7 @@
           <a:p>
             <a:fld id="{63006A8C-99D4-4383-BBE4-60E15D55168A}" type="datetime1">
               <a:rPr lang="en-US" smtClean="0"/>
-              <a:t>6/28/2015</a:t>
+              <a:t>6/29/2015</a:t>
             </a:fld>
             <a:endParaRPr lang="en-US" dirty="0"/>
           </a:p>
@@ -3286,7 +3286,7 @@
           <a:p>
             <a:fld id="{BDB58F00-8420-470D-B044-86BA964AF58E}" type="datetime1">
               <a:rPr lang="en-US" smtClean="0"/>
-              <a:t>6/28/2015</a:t>
+              <a:t>6/29/2015</a:t>
             </a:fld>
             <a:endParaRPr lang="en-US" dirty="0"/>
           </a:p>
@@ -3987,6 +3987,20 @@
               <a:rPr lang="de-DE" dirty="0" smtClean="0"/>
               <a:t>Labyrinth</a:t>
             </a:r>
+          </a:p>
+          <a:p>
+            <a:pPr lvl="1">
+              <a:buFont typeface="Courier New" panose="02070309020205020404" pitchFamily="49" charset="0"/>
+              <a:buChar char="o"/>
+            </a:pPr>
+            <a:r>
+              <a:rPr lang="de-DE" dirty="0"/>
+              <a:t> </a:t>
+            </a:r>
+            <a:r>
+              <a:rPr lang="de-DE" dirty="0" smtClean="0"/>
+              <a:t>Netzwerk</a:t>
+            </a:r>
             <a:endParaRPr lang="de-DE" dirty="0"/>
           </a:p>
         </p:txBody>
@@ -4430,11 +4444,7 @@
           <a:p>
             <a:r>
               <a:rPr lang="de-DE" dirty="0" smtClean="0"/>
-              <a:t>Prototyp: </a:t>
-            </a:r>
-            <a:r>
-              <a:rPr lang="de-DE" dirty="0" smtClean="0"/>
-              <a:t>NETZWERK</a:t>
+              <a:t>Prototyp: NETZWERK</a:t>
             </a:r>
             <a:endParaRPr lang="de-DE" dirty="0"/>
           </a:p>
@@ -4550,6 +4560,32 @@
             <a:r>
               <a:rPr lang="de-DE" dirty="0" smtClean="0"/>
               <a:t>Disconnect-Handling</a:t>
+            </a:r>
+          </a:p>
+          <a:p>
+            <a:pPr lvl="1">
+              <a:buFont typeface="Courier New" panose="02070309020205020404" pitchFamily="49" charset="0"/>
+              <a:buChar char="o"/>
+            </a:pPr>
+            <a:r>
+              <a:rPr lang="de-DE" dirty="0"/>
+              <a:t> </a:t>
+            </a:r>
+            <a:r>
+              <a:rPr lang="de-DE" dirty="0" smtClean="0"/>
+              <a:t>Player </a:t>
+            </a:r>
+            <a:r>
+              <a:rPr lang="de-DE" dirty="0" err="1" smtClean="0"/>
+              <a:t>Collision</a:t>
+            </a:r>
+            <a:r>
+              <a:rPr lang="de-DE" dirty="0" smtClean="0"/>
+              <a:t> </a:t>
+            </a:r>
+            <a:r>
+              <a:rPr lang="de-DE" smtClean="0"/>
+              <a:t>(-&gt; Kampfsystem)</a:t>
             </a:r>
             <a:endParaRPr lang="de-DE" dirty="0"/>
           </a:p>

</xml_diff>